<commit_message>
PPTX file - updated
</commit_message>
<xml_diff>
--- a/source/MultiSequenceLearning_Team_MSL/ML2223_15 Approve Prediction of Multisequence Learning.pptx
+++ b/source/MultiSequenceLearning_Team_MSL/ML2223_15 Approve Prediction of Multisequence Learning.pptx
@@ -6,9 +6,12 @@
   </p:sldMasterIdLst>
   <p:sldIdLst>
     <p:sldId id="256" r:id="rId2"/>
-    <p:sldId id="257" r:id="rId3"/>
-    <p:sldId id="258" r:id="rId4"/>
-    <p:sldId id="259" r:id="rId5"/>
+    <p:sldId id="261" r:id="rId3"/>
+    <p:sldId id="257" r:id="rId4"/>
+    <p:sldId id="258" r:id="rId5"/>
+    <p:sldId id="259" r:id="rId6"/>
+    <p:sldId id="262" r:id="rId7"/>
+    <p:sldId id="260" r:id="rId8"/>
   </p:sldIdLst>
   <p:sldSz cx="12192000" cy="6858000"/>
   <p:notesSz cx="6858000" cy="9144000"/>
@@ -107,6 +110,11 @@
       </a:defRPr>
     </a:lvl9pPr>
   </p:defaultTextStyle>
+  <p:extLst>
+    <p:ext uri="{EFAFB233-063F-42B5-8137-9DF3F51BA10A}">
+      <p15:sldGuideLst xmlns:p15="http://schemas.microsoft.com/office/powerpoint/2012/main"/>
+    </p:ext>
+  </p:extLst>
 </p:presentation>
 </file>
 
@@ -241,7 +249,7 @@
           <a:p>
             <a:fld id="{54BB0E1A-2A42-4456-B338-6C031B28DAA4}" type="datetimeFigureOut">
               <a:rPr lang="en-IN" smtClean="0"/>
-              <a:t>08-03-2023</a:t>
+              <a:t>09-03-2023</a:t>
             </a:fld>
             <a:endParaRPr lang="en-IN"/>
           </a:p>
@@ -411,7 +419,7 @@
           <a:p>
             <a:fld id="{54BB0E1A-2A42-4456-B338-6C031B28DAA4}" type="datetimeFigureOut">
               <a:rPr lang="en-IN" smtClean="0"/>
-              <a:t>08-03-2023</a:t>
+              <a:t>09-03-2023</a:t>
             </a:fld>
             <a:endParaRPr lang="en-IN"/>
           </a:p>
@@ -591,7 +599,7 @@
           <a:p>
             <a:fld id="{54BB0E1A-2A42-4456-B338-6C031B28DAA4}" type="datetimeFigureOut">
               <a:rPr lang="en-IN" smtClean="0"/>
-              <a:t>08-03-2023</a:t>
+              <a:t>09-03-2023</a:t>
             </a:fld>
             <a:endParaRPr lang="en-IN"/>
           </a:p>
@@ -761,7 +769,7 @@
           <a:p>
             <a:fld id="{54BB0E1A-2A42-4456-B338-6C031B28DAA4}" type="datetimeFigureOut">
               <a:rPr lang="en-IN" smtClean="0"/>
-              <a:t>08-03-2023</a:t>
+              <a:t>09-03-2023</a:t>
             </a:fld>
             <a:endParaRPr lang="en-IN"/>
           </a:p>
@@ -1007,7 +1015,7 @@
           <a:p>
             <a:fld id="{54BB0E1A-2A42-4456-B338-6C031B28DAA4}" type="datetimeFigureOut">
               <a:rPr lang="en-IN" smtClean="0"/>
-              <a:t>08-03-2023</a:t>
+              <a:t>09-03-2023</a:t>
             </a:fld>
             <a:endParaRPr lang="en-IN"/>
           </a:p>
@@ -1239,7 +1247,7 @@
           <a:p>
             <a:fld id="{54BB0E1A-2A42-4456-B338-6C031B28DAA4}" type="datetimeFigureOut">
               <a:rPr lang="en-IN" smtClean="0"/>
-              <a:t>08-03-2023</a:t>
+              <a:t>09-03-2023</a:t>
             </a:fld>
             <a:endParaRPr lang="en-IN"/>
           </a:p>
@@ -1606,7 +1614,7 @@
           <a:p>
             <a:fld id="{54BB0E1A-2A42-4456-B338-6C031B28DAA4}" type="datetimeFigureOut">
               <a:rPr lang="en-IN" smtClean="0"/>
-              <a:t>08-03-2023</a:t>
+              <a:t>09-03-2023</a:t>
             </a:fld>
             <a:endParaRPr lang="en-IN"/>
           </a:p>
@@ -1724,7 +1732,7 @@
           <a:p>
             <a:fld id="{54BB0E1A-2A42-4456-B338-6C031B28DAA4}" type="datetimeFigureOut">
               <a:rPr lang="en-IN" smtClean="0"/>
-              <a:t>08-03-2023</a:t>
+              <a:t>09-03-2023</a:t>
             </a:fld>
             <a:endParaRPr lang="en-IN"/>
           </a:p>
@@ -1819,7 +1827,7 @@
           <a:p>
             <a:fld id="{54BB0E1A-2A42-4456-B338-6C031B28DAA4}" type="datetimeFigureOut">
               <a:rPr lang="en-IN" smtClean="0"/>
-              <a:t>08-03-2023</a:t>
+              <a:t>09-03-2023</a:t>
             </a:fld>
             <a:endParaRPr lang="en-IN"/>
           </a:p>
@@ -2096,7 +2104,7 @@
           <a:p>
             <a:fld id="{54BB0E1A-2A42-4456-B338-6C031B28DAA4}" type="datetimeFigureOut">
               <a:rPr lang="en-IN" smtClean="0"/>
-              <a:t>08-03-2023</a:t>
+              <a:t>09-03-2023</a:t>
             </a:fld>
             <a:endParaRPr lang="en-IN"/>
           </a:p>
@@ -2353,7 +2361,7 @@
           <a:p>
             <a:fld id="{54BB0E1A-2A42-4456-B338-6C031B28DAA4}" type="datetimeFigureOut">
               <a:rPr lang="en-IN" smtClean="0"/>
-              <a:t>08-03-2023</a:t>
+              <a:t>09-03-2023</a:t>
             </a:fld>
             <a:endParaRPr lang="en-IN"/>
           </a:p>
@@ -2566,7 +2574,7 @@
           <a:p>
             <a:fld id="{54BB0E1A-2A42-4456-B338-6C031B28DAA4}" type="datetimeFigureOut">
               <a:rPr lang="en-IN" smtClean="0"/>
-              <a:t>08-03-2023</a:t>
+              <a:t>09-03-2023</a:t>
             </a:fld>
             <a:endParaRPr lang="en-IN"/>
           </a:p>
@@ -3355,7 +3363,7 @@
           <p:cNvPr id="2" name="Title 1">
             <a:extLst>
               <a:ext uri="{FF2B5EF4-FFF2-40B4-BE49-F238E27FC236}">
-                <a16:creationId xmlns:a16="http://schemas.microsoft.com/office/drawing/2014/main" id="{91BC9D15-6812-3F65-8224-F796DC5755D7}"/>
+                <a16:creationId xmlns:a16="http://schemas.microsoft.com/office/drawing/2014/main" id="{EFE91EEE-50BD-7B7F-AD0E-95901CE93C39}"/>
               </a:ext>
             </a:extLst>
           </p:cNvPr>
@@ -3368,8 +3376,8 @@
         </p:nvSpPr>
         <p:spPr>
           <a:xfrm>
-            <a:off x="898850" y="877077"/>
-            <a:ext cx="9144000" cy="2127381"/>
+            <a:off x="1524000" y="1122363"/>
+            <a:ext cx="9144000" cy="883719"/>
           </a:xfrm>
         </p:spPr>
         <p:txBody>
@@ -3378,135 +3386,17 @@
           </a:bodyPr>
           <a:lstStyle/>
           <a:p>
-            <a:pPr algn="l"/>
-            <a:r>
-              <a:rPr lang="en-IN" sz="1800" dirty="0">
-                <a:effectLst/>
-                <a:latin typeface="Calibri" panose="020F0502020204030204" pitchFamily="34" charset="0"/>
-                <a:ea typeface="Calibri" panose="020F0502020204030204" pitchFamily="34" charset="0"/>
-                <a:cs typeface="Times New Roman" panose="02020603050405020304" pitchFamily="18" charset="0"/>
-              </a:rPr>
-              <a:t>Created two new methods - </a:t>
-            </a:r>
-            <a:br>
-              <a:rPr lang="en-IN" sz="1800" dirty="0">
-                <a:latin typeface="Calibri" panose="020F0502020204030204" pitchFamily="34" charset="0"/>
-                <a:ea typeface="Calibri" panose="020F0502020204030204" pitchFamily="34" charset="0"/>
-                <a:cs typeface="Times New Roman" panose="02020603050405020304" pitchFamily="18" charset="0"/>
-              </a:rPr>
-            </a:br>
-            <a:r>
-              <a:rPr lang="en-IN" sz="1800" dirty="0">
-                <a:latin typeface="Calibri" panose="020F0502020204030204" pitchFamily="34" charset="0"/>
-                <a:ea typeface="Calibri" panose="020F0502020204030204" pitchFamily="34" charset="0"/>
-                <a:cs typeface="Times New Roman" panose="02020603050405020304" pitchFamily="18" charset="0"/>
-              </a:rPr>
-              <a:t>1. </a:t>
-            </a:r>
-            <a:r>
-              <a:rPr lang="en-IN" sz="1800" dirty="0">
-                <a:effectLst/>
-                <a:latin typeface="Calibri" panose="020F0502020204030204" pitchFamily="34" charset="0"/>
-                <a:ea typeface="Calibri" panose="020F0502020204030204" pitchFamily="34" charset="0"/>
-                <a:cs typeface="Times New Roman" panose="02020603050405020304" pitchFamily="18" charset="0"/>
-              </a:rPr>
-              <a:t> </a:t>
-            </a:r>
-            <a:r>
-              <a:rPr lang="en-IN" sz="1800" dirty="0" err="1">
-                <a:effectLst/>
-                <a:latin typeface="Calibri" panose="020F0502020204030204" pitchFamily="34" charset="0"/>
-                <a:ea typeface="Calibri" panose="020F0502020204030204" pitchFamily="34" charset="0"/>
-                <a:cs typeface="Times New Roman" panose="02020603050405020304" pitchFamily="18" charset="0"/>
-              </a:rPr>
-              <a:t>GetInputFromTextFile</a:t>
-            </a:r>
-            <a:r>
-              <a:rPr lang="en-IN" sz="1800" dirty="0">
-                <a:effectLst/>
-                <a:latin typeface="Calibri" panose="020F0502020204030204" pitchFamily="34" charset="0"/>
-                <a:ea typeface="Calibri" panose="020F0502020204030204" pitchFamily="34" charset="0"/>
-                <a:cs typeface="Times New Roman" panose="02020603050405020304" pitchFamily="18" charset="0"/>
-              </a:rPr>
-              <a:t> - Created new method in </a:t>
-            </a:r>
-            <a:r>
-              <a:rPr lang="en-IN" sz="1800" dirty="0" err="1">
-                <a:effectLst/>
-                <a:latin typeface="Calibri" panose="020F0502020204030204" pitchFamily="34" charset="0"/>
-                <a:ea typeface="Calibri" panose="020F0502020204030204" pitchFamily="34" charset="0"/>
-                <a:cs typeface="Times New Roman" panose="02020603050405020304" pitchFamily="18" charset="0"/>
-              </a:rPr>
-              <a:t>Program.cs</a:t>
-            </a:r>
-            <a:r>
-              <a:rPr lang="en-IN" sz="1800" dirty="0">
-                <a:effectLst/>
-                <a:latin typeface="Calibri" panose="020F0502020204030204" pitchFamily="34" charset="0"/>
-                <a:ea typeface="Calibri" panose="020F0502020204030204" pitchFamily="34" charset="0"/>
-                <a:cs typeface="Times New Roman" panose="02020603050405020304" pitchFamily="18" charset="0"/>
-              </a:rPr>
-              <a:t> for eliminating the hard coded inputs and getting from local text file.</a:t>
-            </a:r>
-            <a:br>
-              <a:rPr lang="en-IN" sz="1800" dirty="0">
-                <a:effectLst/>
-                <a:latin typeface="Calibri" panose="020F0502020204030204" pitchFamily="34" charset="0"/>
-                <a:ea typeface="Calibri" panose="020F0502020204030204" pitchFamily="34" charset="0"/>
-                <a:cs typeface="Times New Roman" panose="02020603050405020304" pitchFamily="18" charset="0"/>
-              </a:rPr>
-            </a:br>
-            <a:br>
-              <a:rPr lang="en-IN" sz="1800" dirty="0">
-                <a:effectLst/>
-                <a:latin typeface="Calibri" panose="020F0502020204030204" pitchFamily="34" charset="0"/>
-                <a:ea typeface="Calibri" panose="020F0502020204030204" pitchFamily="34" charset="0"/>
-                <a:cs typeface="Times New Roman" panose="02020603050405020304" pitchFamily="18" charset="0"/>
-              </a:rPr>
-            </a:br>
-            <a:r>
-              <a:rPr lang="en-IN" sz="1800" dirty="0">
-                <a:effectLst/>
-                <a:latin typeface="Calibri" panose="020F0502020204030204" pitchFamily="34" charset="0"/>
-                <a:ea typeface="Calibri" panose="020F0502020204030204" pitchFamily="34" charset="0"/>
-                <a:cs typeface="Times New Roman" panose="02020603050405020304" pitchFamily="18" charset="0"/>
-              </a:rPr>
-              <a:t>2. </a:t>
-            </a:r>
-            <a:r>
-              <a:rPr lang="en-IN" sz="1800" dirty="0" err="1">
-                <a:effectLst/>
-                <a:latin typeface="Calibri" panose="020F0502020204030204" pitchFamily="34" charset="0"/>
-                <a:ea typeface="Calibri" panose="020F0502020204030204" pitchFamily="34" charset="0"/>
-                <a:cs typeface="Times New Roman" panose="02020603050405020304" pitchFamily="18" charset="0"/>
-              </a:rPr>
-              <a:t>GetSubSequenceInputFromTextFile</a:t>
-            </a:r>
-            <a:r>
-              <a:rPr lang="en-IN" sz="1800" dirty="0">
-                <a:effectLst/>
-                <a:latin typeface="Calibri" panose="020F0502020204030204" pitchFamily="34" charset="0"/>
-                <a:ea typeface="Calibri" panose="020F0502020204030204" pitchFamily="34" charset="0"/>
-                <a:cs typeface="Times New Roman" panose="02020603050405020304" pitchFamily="18" charset="0"/>
-              </a:rPr>
-              <a:t> - Written the logic for subsequence inputs.</a:t>
-            </a:r>
-            <a:br>
-              <a:rPr lang="en-IN" sz="1800" dirty="0">
-                <a:effectLst/>
-                <a:latin typeface="Calibri" panose="020F0502020204030204" pitchFamily="34" charset="0"/>
-                <a:ea typeface="Calibri" panose="020F0502020204030204" pitchFamily="34" charset="0"/>
-                <a:cs typeface="Times New Roman" panose="02020603050405020304" pitchFamily="18" charset="0"/>
-              </a:rPr>
-            </a:br>
-            <a:endParaRPr lang="en-IN" dirty="0"/>
+            <a:r>
+              <a:rPr lang="en-IN" dirty="0"/>
+              <a:t>List of Contents</a:t>
+            </a:r>
           </a:p>
         </p:txBody>
       </p:sp>
     </p:spTree>
     <p:extLst>
       <p:ext uri="{BB962C8B-B14F-4D97-AF65-F5344CB8AC3E}">
-        <p14:creationId xmlns:p14="http://schemas.microsoft.com/office/powerpoint/2010/main" val="813257359"/>
+        <p14:creationId xmlns:p14="http://schemas.microsoft.com/office/powerpoint/2010/main" val="940406503"/>
       </p:ext>
     </p:extLst>
   </p:cSld>
@@ -3538,7 +3428,7 @@
           <p:cNvPr id="2" name="Title 1">
             <a:extLst>
               <a:ext uri="{FF2B5EF4-FFF2-40B4-BE49-F238E27FC236}">
-                <a16:creationId xmlns:a16="http://schemas.microsoft.com/office/drawing/2014/main" id="{93CDC275-56DB-27C6-C85A-06B3C980E705}"/>
+                <a16:creationId xmlns:a16="http://schemas.microsoft.com/office/drawing/2014/main" id="{91BC9D15-6812-3F65-8224-F796DC5755D7}"/>
               </a:ext>
             </a:extLst>
           </p:cNvPr>
@@ -3546,13 +3436,13 @@
             <a:spLocks noGrp="1"/>
           </p:cNvSpPr>
           <p:nvPr>
-            <p:ph type="title"/>
+            <p:ph type="ctrTitle"/>
           </p:nvPr>
         </p:nvSpPr>
         <p:spPr>
           <a:xfrm>
-            <a:off x="838200" y="365126"/>
-            <a:ext cx="10515600" cy="773210"/>
+            <a:off x="898850" y="877077"/>
+            <a:ext cx="10801738" cy="2948474"/>
           </a:xfrm>
         </p:spPr>
         <p:txBody>
@@ -3561,85 +3451,329 @@
           </a:bodyPr>
           <a:lstStyle/>
           <a:p>
-            <a:r>
-              <a:rPr lang="en-IN" sz="1800" b="1" u="sng" dirty="0">
-                <a:effectLst/>
-                <a:latin typeface="Calibri" panose="020F0502020204030204" pitchFamily="34" charset="0"/>
-                <a:ea typeface="Calibri" panose="020F0502020204030204" pitchFamily="34" charset="0"/>
-                <a:cs typeface="Times New Roman" panose="02020603050405020304" pitchFamily="18" charset="0"/>
-              </a:rPr>
-              <a:t>Hierarchical Temporal Memory</a:t>
-            </a:r>
-            <a:endParaRPr lang="en-IN" u="sng" dirty="0"/>
-          </a:p>
-        </p:txBody>
-      </p:sp>
-      <p:sp>
-        <p:nvSpPr>
-          <p:cNvPr id="3" name="Content Placeholder 2">
-            <a:extLst>
-              <a:ext uri="{FF2B5EF4-FFF2-40B4-BE49-F238E27FC236}">
-                <a16:creationId xmlns:a16="http://schemas.microsoft.com/office/drawing/2014/main" id="{9A3F1674-4EFD-6853-EC88-45F59B311249}"/>
-              </a:ext>
-            </a:extLst>
-          </p:cNvPr>
-          <p:cNvSpPr>
-            <a:spLocks noGrp="1"/>
-          </p:cNvSpPr>
-          <p:nvPr>
-            <p:ph idx="1"/>
-          </p:nvPr>
-        </p:nvSpPr>
-        <p:spPr/>
-        <p:txBody>
-          <a:bodyPr/>
-          <a:lstStyle/>
-          <a:p>
-            <a:r>
-              <a:rPr lang="en-IN" sz="1800" dirty="0">
-                <a:effectLst/>
-                <a:latin typeface="Calibri" panose="020F0502020204030204" pitchFamily="34" charset="0"/>
-                <a:ea typeface="Calibri" panose="020F0502020204030204" pitchFamily="34" charset="0"/>
-                <a:cs typeface="Calibri" panose="020F0502020204030204" pitchFamily="34" charset="0"/>
-              </a:rPr>
-              <a:t>In this project we are using - Scalar Encoder </a:t>
-            </a:r>
+            <a:pPr algn="l"/>
+            <a:r>
+              <a:rPr lang="en-IN" sz="1800" dirty="0">
+                <a:latin typeface="+mn-lt"/>
+                <a:ea typeface="Calibri" panose="020F0502020204030204" pitchFamily="34" charset="0"/>
+                <a:cs typeface="Times New Roman" panose="02020603050405020304" pitchFamily="18" charset="0"/>
+              </a:rPr>
+              <a:t>List of </a:t>
+            </a:r>
+            <a:r>
+              <a:rPr lang="en-IN" sz="1800" dirty="0">
+                <a:effectLst/>
+                <a:latin typeface="+mn-lt"/>
+                <a:ea typeface="Calibri" panose="020F0502020204030204" pitchFamily="34" charset="0"/>
+                <a:cs typeface="Times New Roman" panose="02020603050405020304" pitchFamily="18" charset="0"/>
+              </a:rPr>
+              <a:t>methods - </a:t>
+            </a:r>
+            <a:br>
+              <a:rPr lang="en-IN" sz="1800" dirty="0">
+                <a:latin typeface="+mn-lt"/>
+                <a:ea typeface="Calibri" panose="020F0502020204030204" pitchFamily="34" charset="0"/>
+                <a:cs typeface="Times New Roman" panose="02020603050405020304" pitchFamily="18" charset="0"/>
+              </a:rPr>
+            </a:br>
+            <a:r>
+              <a:rPr lang="en-IN" sz="1800" dirty="0">
+                <a:latin typeface="+mn-lt"/>
+                <a:ea typeface="Calibri" panose="020F0502020204030204" pitchFamily="34" charset="0"/>
+                <a:cs typeface="Times New Roman" panose="02020603050405020304" pitchFamily="18" charset="0"/>
+              </a:rPr>
+              <a:t>1. </a:t>
+            </a:r>
+            <a:r>
+              <a:rPr lang="en-IN" sz="1800" dirty="0">
+                <a:effectLst/>
+                <a:latin typeface="+mn-lt"/>
+                <a:ea typeface="Calibri" panose="020F0502020204030204" pitchFamily="34" charset="0"/>
+                <a:cs typeface="Times New Roman" panose="02020603050405020304" pitchFamily="18" charset="0"/>
+              </a:rPr>
+              <a:t> </a:t>
+            </a:r>
+            <a:r>
+              <a:rPr lang="en-IN" sz="1800" dirty="0" err="1">
+                <a:effectLst/>
+                <a:latin typeface="+mn-lt"/>
+                <a:ea typeface="Calibri" panose="020F0502020204030204" pitchFamily="34" charset="0"/>
+                <a:cs typeface="Times New Roman" panose="02020603050405020304" pitchFamily="18" charset="0"/>
+              </a:rPr>
+              <a:t>GetInputFromTextFile</a:t>
+            </a:r>
+            <a:r>
+              <a:rPr lang="en-IN" sz="1800" dirty="0">
+                <a:effectLst/>
+                <a:latin typeface="+mn-lt"/>
+                <a:ea typeface="Calibri" panose="020F0502020204030204" pitchFamily="34" charset="0"/>
+                <a:cs typeface="Times New Roman" panose="02020603050405020304" pitchFamily="18" charset="0"/>
+              </a:rPr>
+              <a:t> –</a:t>
+            </a:r>
+            <a:br>
+              <a:rPr lang="en-IN" sz="1800" dirty="0">
+                <a:effectLst/>
+                <a:latin typeface="+mn-lt"/>
+                <a:ea typeface="Calibri" panose="020F0502020204030204" pitchFamily="34" charset="0"/>
+                <a:cs typeface="Times New Roman" panose="02020603050405020304" pitchFamily="18" charset="0"/>
+              </a:rPr>
+            </a:br>
+            <a:r>
+              <a:rPr lang="en-IN" sz="1800" dirty="0">
+                <a:effectLst/>
+                <a:latin typeface="+mn-lt"/>
+                <a:ea typeface="Calibri" panose="020F0502020204030204" pitchFamily="34" charset="0"/>
+                <a:cs typeface="Times New Roman" panose="02020603050405020304" pitchFamily="18" charset="0"/>
+              </a:rPr>
+              <a:t>     </a:t>
+            </a:r>
+            <a:r>
+              <a:rPr lang="en-IN" sz="1800" dirty="0" err="1">
+                <a:effectLst/>
+                <a:latin typeface="+mn-lt"/>
+                <a:ea typeface="Calibri" panose="020F0502020204030204" pitchFamily="34" charset="0"/>
+                <a:cs typeface="Times New Roman" panose="02020603050405020304" pitchFamily="18" charset="0"/>
+              </a:rPr>
+              <a:t>i</a:t>
+            </a:r>
+            <a:r>
+              <a:rPr lang="en-IN" sz="1800" dirty="0">
+                <a:effectLst/>
+                <a:latin typeface="+mn-lt"/>
+                <a:ea typeface="Calibri" panose="020F0502020204030204" pitchFamily="34" charset="0"/>
+                <a:cs typeface="Times New Roman" panose="02020603050405020304" pitchFamily="18" charset="0"/>
+              </a:rPr>
+              <a:t>. Created new method in </a:t>
+            </a:r>
+            <a:r>
+              <a:rPr lang="en-IN" sz="1800" dirty="0" err="1">
+                <a:effectLst/>
+                <a:latin typeface="+mn-lt"/>
+                <a:ea typeface="Calibri" panose="020F0502020204030204" pitchFamily="34" charset="0"/>
+                <a:cs typeface="Times New Roman" panose="02020603050405020304" pitchFamily="18" charset="0"/>
+              </a:rPr>
+              <a:t>Program.cs</a:t>
+            </a:r>
+            <a:r>
+              <a:rPr lang="en-IN" sz="1800" dirty="0">
+                <a:effectLst/>
+                <a:latin typeface="+mn-lt"/>
+                <a:ea typeface="Calibri" panose="020F0502020204030204" pitchFamily="34" charset="0"/>
+                <a:cs typeface="Times New Roman" panose="02020603050405020304" pitchFamily="18" charset="0"/>
+              </a:rPr>
+              <a:t> for eliminating the hard coded inputs and getting from local text file.</a:t>
+            </a:r>
+            <a:br>
+              <a:rPr lang="en-IN" sz="1800" dirty="0">
+                <a:effectLst/>
+                <a:latin typeface="+mn-lt"/>
+                <a:ea typeface="Calibri" panose="020F0502020204030204" pitchFamily="34" charset="0"/>
+                <a:cs typeface="Times New Roman" panose="02020603050405020304" pitchFamily="18" charset="0"/>
+              </a:rPr>
+            </a:br>
+            <a:r>
+              <a:rPr lang="en-IN" sz="1800" dirty="0">
+                <a:effectLst/>
+                <a:latin typeface="+mn-lt"/>
+                <a:ea typeface="Calibri" panose="020F0502020204030204" pitchFamily="34" charset="0"/>
+                <a:cs typeface="Times New Roman" panose="02020603050405020304" pitchFamily="18" charset="0"/>
+              </a:rPr>
+              <a:t>    </a:t>
+            </a:r>
+            <a:r>
+              <a:rPr lang="en-IN" sz="1800" dirty="0" err="1">
+                <a:effectLst/>
+                <a:latin typeface="+mn-lt"/>
+                <a:ea typeface="Calibri" panose="020F0502020204030204" pitchFamily="34" charset="0"/>
+                <a:cs typeface="Times New Roman" panose="02020603050405020304" pitchFamily="18" charset="0"/>
+              </a:rPr>
+              <a:t>Ii</a:t>
+            </a:r>
+            <a:r>
+              <a:rPr lang="en-IN" sz="1800" dirty="0">
+                <a:effectLst/>
+                <a:latin typeface="+mn-lt"/>
+                <a:ea typeface="Calibri" panose="020F0502020204030204" pitchFamily="34" charset="0"/>
+                <a:cs typeface="Times New Roman" panose="02020603050405020304" pitchFamily="18" charset="0"/>
+              </a:rPr>
+              <a:t>. </a:t>
+            </a:r>
+            <a:r>
+              <a:rPr lang="en-IN" sz="1800" dirty="0" err="1">
+                <a:effectLst/>
+                <a:latin typeface="+mn-lt"/>
+                <a:ea typeface="Calibri" panose="020F0502020204030204" pitchFamily="34" charset="0"/>
+                <a:cs typeface="Times New Roman" panose="02020603050405020304" pitchFamily="18" charset="0"/>
+              </a:rPr>
+              <a:t>Splitted</a:t>
+            </a:r>
+            <a:r>
+              <a:rPr lang="en-IN" sz="1800" dirty="0">
+                <a:effectLst/>
+                <a:latin typeface="+mn-lt"/>
+                <a:ea typeface="Calibri" panose="020F0502020204030204" pitchFamily="34" charset="0"/>
+                <a:cs typeface="Times New Roman" panose="02020603050405020304" pitchFamily="18" charset="0"/>
+              </a:rPr>
+              <a:t> out the input sequences using </a:t>
+            </a:r>
+            <a:r>
+              <a:rPr lang="en-IN" sz="1800" dirty="0" err="1">
+                <a:effectLst/>
+                <a:latin typeface="+mn-lt"/>
+                <a:ea typeface="Calibri" panose="020F0502020204030204" pitchFamily="34" charset="0"/>
+                <a:cs typeface="Times New Roman" panose="02020603050405020304" pitchFamily="18" charset="0"/>
+              </a:rPr>
+              <a:t>regulare</a:t>
+            </a:r>
+            <a:r>
+              <a:rPr lang="en-IN" sz="1800" dirty="0">
+                <a:effectLst/>
+                <a:latin typeface="+mn-lt"/>
+                <a:ea typeface="Calibri" panose="020F0502020204030204" pitchFamily="34" charset="0"/>
+                <a:cs typeface="Times New Roman" panose="02020603050405020304" pitchFamily="18" charset="0"/>
+              </a:rPr>
+              <a:t> expression.</a:t>
+            </a:r>
+            <a:br>
+              <a:rPr lang="en-IN" sz="1800" dirty="0">
+                <a:effectLst/>
+                <a:latin typeface="+mn-lt"/>
+                <a:ea typeface="Calibri" panose="020F0502020204030204" pitchFamily="34" charset="0"/>
+                <a:cs typeface="Times New Roman" panose="02020603050405020304" pitchFamily="18" charset="0"/>
+              </a:rPr>
+            </a:br>
+            <a:br>
+              <a:rPr lang="en-IN" sz="1800" dirty="0">
+                <a:effectLst/>
+                <a:latin typeface="+mn-lt"/>
+                <a:ea typeface="Calibri" panose="020F0502020204030204" pitchFamily="34" charset="0"/>
+                <a:cs typeface="Times New Roman" panose="02020603050405020304" pitchFamily="18" charset="0"/>
+              </a:rPr>
+            </a:br>
+            <a:br>
+              <a:rPr lang="en-IN" sz="1800" dirty="0">
+                <a:effectLst/>
+                <a:latin typeface="+mn-lt"/>
+                <a:ea typeface="Calibri" panose="020F0502020204030204" pitchFamily="34" charset="0"/>
+                <a:cs typeface="Times New Roman" panose="02020603050405020304" pitchFamily="18" charset="0"/>
+              </a:rPr>
+            </a:br>
+            <a:r>
+              <a:rPr lang="en-IN" sz="1800" dirty="0">
+                <a:effectLst/>
+                <a:latin typeface="+mn-lt"/>
+                <a:ea typeface="Calibri" panose="020F0502020204030204" pitchFamily="34" charset="0"/>
+                <a:cs typeface="Times New Roman" panose="02020603050405020304" pitchFamily="18" charset="0"/>
+              </a:rPr>
+              <a:t>2. </a:t>
+            </a:r>
+            <a:r>
+              <a:rPr lang="en-IN" sz="1800" dirty="0" err="1">
+                <a:effectLst/>
+                <a:latin typeface="+mn-lt"/>
+                <a:ea typeface="Calibri" panose="020F0502020204030204" pitchFamily="34" charset="0"/>
+                <a:cs typeface="Times New Roman" panose="02020603050405020304" pitchFamily="18" charset="0"/>
+              </a:rPr>
+              <a:t>GetSubSequenceInputFromTextFile</a:t>
+            </a:r>
+            <a:r>
+              <a:rPr lang="en-IN" sz="1800" dirty="0">
+                <a:effectLst/>
+                <a:latin typeface="+mn-lt"/>
+                <a:ea typeface="Calibri" panose="020F0502020204030204" pitchFamily="34" charset="0"/>
+                <a:cs typeface="Times New Roman" panose="02020603050405020304" pitchFamily="18" charset="0"/>
+              </a:rPr>
+              <a:t> - Written the logic for subsequence inputs.</a:t>
+            </a:r>
+            <a:br>
+              <a:rPr lang="en-IN" sz="1800" dirty="0">
+                <a:effectLst/>
+                <a:latin typeface="+mn-lt"/>
+                <a:ea typeface="Calibri" panose="020F0502020204030204" pitchFamily="34" charset="0"/>
+                <a:cs typeface="Times New Roman" panose="02020603050405020304" pitchFamily="18" charset="0"/>
+              </a:rPr>
+            </a:br>
+            <a:r>
+              <a:rPr lang="en-IN" sz="1800" dirty="0">
+                <a:effectLst/>
+                <a:latin typeface="+mn-lt"/>
+                <a:ea typeface="Calibri" panose="020F0502020204030204" pitchFamily="34" charset="0"/>
+                <a:cs typeface="Times New Roman" panose="02020603050405020304" pitchFamily="18" charset="0"/>
+              </a:rPr>
+              <a:t>3. </a:t>
+            </a:r>
+            <a:r>
+              <a:rPr lang="en-IN" sz="1800" dirty="0" err="1">
+                <a:solidFill>
+                  <a:srgbClr val="000000"/>
+                </a:solidFill>
+                <a:latin typeface="+mn-lt"/>
+              </a:rPr>
+              <a:t>PredictNextElement</a:t>
+            </a:r>
+            <a:r>
+              <a:rPr lang="en-IN" sz="1800" dirty="0">
+                <a:solidFill>
+                  <a:srgbClr val="000000"/>
+                </a:solidFill>
+                <a:latin typeface="+mn-lt"/>
+              </a:rPr>
+              <a:t>(predictor, list) -</a:t>
+            </a:r>
+            <a:br>
+              <a:rPr lang="en-IN" sz="1800" dirty="0">
+                <a:solidFill>
+                  <a:srgbClr val="000000"/>
+                </a:solidFill>
+                <a:latin typeface="+mn-lt"/>
+              </a:rPr>
+            </a:br>
+            <a:r>
+              <a:rPr lang="en-IN" sz="1800" dirty="0">
+                <a:solidFill>
+                  <a:srgbClr val="000000"/>
+                </a:solidFill>
+                <a:latin typeface="+mn-lt"/>
+              </a:rPr>
+              <a:t>4. </a:t>
+            </a:r>
+            <a:r>
+              <a:rPr lang="en-IN" sz="1800" dirty="0" err="1">
+                <a:solidFill>
+                  <a:srgbClr val="000000"/>
+                </a:solidFill>
+                <a:latin typeface="+mn-lt"/>
+              </a:rPr>
+              <a:t>RunPredictionMultiSequenceExperiment</a:t>
+            </a:r>
+            <a:r>
+              <a:rPr lang="en-IN" sz="1800" dirty="0">
+                <a:solidFill>
+                  <a:srgbClr val="000000"/>
+                </a:solidFill>
+                <a:latin typeface="+mn-lt"/>
+              </a:rPr>
+              <a:t>() -</a:t>
+            </a:r>
+            <a:br>
+              <a:rPr lang="en-IN" sz="1800" dirty="0">
+                <a:effectLst/>
+                <a:latin typeface="+mn-lt"/>
+                <a:ea typeface="Calibri" panose="020F0502020204030204" pitchFamily="34" charset="0"/>
+                <a:cs typeface="Times New Roman" panose="02020603050405020304" pitchFamily="18" charset="0"/>
+              </a:rPr>
+            </a:br>
             <a:endParaRPr lang="en-IN" sz="1800" dirty="0">
-              <a:effectLst/>
-              <a:latin typeface="Calibri" panose="020F0502020204030204" pitchFamily="34" charset="0"/>
-              <a:ea typeface="Calibri" panose="020F0502020204030204" pitchFamily="34" charset="0"/>
-              <a:cs typeface="Times New Roman" panose="02020603050405020304" pitchFamily="18" charset="0"/>
+              <a:latin typeface="+mn-lt"/>
             </a:endParaRPr>
-          </a:p>
-          <a:p>
-            <a:pPr marL="0" indent="0">
-              <a:buNone/>
-            </a:pPr>
-            <a:r>
-              <a:rPr lang="en-IN" sz="1800" dirty="0">
-                <a:effectLst/>
-                <a:latin typeface="Calibri" panose="020F0502020204030204" pitchFamily="34" charset="0"/>
-                <a:ea typeface="Calibri" panose="020F0502020204030204" pitchFamily="34" charset="0"/>
-                <a:cs typeface="Calibri" panose="020F0502020204030204" pitchFamily="34" charset="0"/>
-              </a:rPr>
-              <a:t>1. The main purpose for scalar encoder is to encode numeric or floating-point value into an array of bits, where the output has 0’s with an adjacent block of 1’s. The location of the block of 1’s varies continuously depending on the input value.</a:t>
-            </a:r>
-            <a:endParaRPr lang="en-IN" sz="1800" dirty="0">
-              <a:effectLst/>
-              <a:latin typeface="Calibri" panose="020F0502020204030204" pitchFamily="34" charset="0"/>
-              <a:ea typeface="Calibri" panose="020F0502020204030204" pitchFamily="34" charset="0"/>
-              <a:cs typeface="Times New Roman" panose="02020603050405020304" pitchFamily="18" charset="0"/>
-            </a:endParaRPr>
-          </a:p>
-          <a:p>
-            <a:endParaRPr lang="en-IN" dirty="0"/>
           </a:p>
         </p:txBody>
       </p:sp>
     </p:spTree>
     <p:extLst>
       <p:ext uri="{BB962C8B-B14F-4D97-AF65-F5344CB8AC3E}">
-        <p14:creationId xmlns:p14="http://schemas.microsoft.com/office/powerpoint/2010/main" val="495733682"/>
+        <p14:creationId xmlns:p14="http://schemas.microsoft.com/office/powerpoint/2010/main" val="813257359"/>
       </p:ext>
     </p:extLst>
   </p:cSld>
@@ -3671,6 +3805,139 @@
           <p:cNvPr id="2" name="Title 1">
             <a:extLst>
               <a:ext uri="{FF2B5EF4-FFF2-40B4-BE49-F238E27FC236}">
+                <a16:creationId xmlns:a16="http://schemas.microsoft.com/office/drawing/2014/main" id="{93CDC275-56DB-27C6-C85A-06B3C980E705}"/>
+              </a:ext>
+            </a:extLst>
+          </p:cNvPr>
+          <p:cNvSpPr>
+            <a:spLocks noGrp="1"/>
+          </p:cNvSpPr>
+          <p:nvPr>
+            <p:ph type="title"/>
+          </p:nvPr>
+        </p:nvSpPr>
+        <p:spPr>
+          <a:xfrm>
+            <a:off x="838200" y="365126"/>
+            <a:ext cx="10515600" cy="773210"/>
+          </a:xfrm>
+        </p:spPr>
+        <p:txBody>
+          <a:bodyPr>
+            <a:normAutofit/>
+          </a:bodyPr>
+          <a:lstStyle/>
+          <a:p>
+            <a:r>
+              <a:rPr lang="en-IN" sz="1800" b="1" u="sng" dirty="0">
+                <a:effectLst/>
+                <a:latin typeface="Calibri" panose="020F0502020204030204" pitchFamily="34" charset="0"/>
+                <a:ea typeface="Calibri" panose="020F0502020204030204" pitchFamily="34" charset="0"/>
+                <a:cs typeface="Times New Roman" panose="02020603050405020304" pitchFamily="18" charset="0"/>
+              </a:rPr>
+              <a:t>Hierarchical Temporal Memory</a:t>
+            </a:r>
+            <a:endParaRPr lang="en-IN" u="sng" dirty="0"/>
+          </a:p>
+        </p:txBody>
+      </p:sp>
+      <p:sp>
+        <p:nvSpPr>
+          <p:cNvPr id="3" name="Content Placeholder 2">
+            <a:extLst>
+              <a:ext uri="{FF2B5EF4-FFF2-40B4-BE49-F238E27FC236}">
+                <a16:creationId xmlns:a16="http://schemas.microsoft.com/office/drawing/2014/main" id="{9A3F1674-4EFD-6853-EC88-45F59B311249}"/>
+              </a:ext>
+            </a:extLst>
+          </p:cNvPr>
+          <p:cNvSpPr>
+            <a:spLocks noGrp="1"/>
+          </p:cNvSpPr>
+          <p:nvPr>
+            <p:ph idx="1"/>
+          </p:nvPr>
+        </p:nvSpPr>
+        <p:spPr/>
+        <p:txBody>
+          <a:bodyPr/>
+          <a:lstStyle/>
+          <a:p>
+            <a:r>
+              <a:rPr lang="en-IN" sz="1800" dirty="0">
+                <a:effectLst/>
+                <a:latin typeface="Calibri" panose="020F0502020204030204" pitchFamily="34" charset="0"/>
+                <a:ea typeface="Calibri" panose="020F0502020204030204" pitchFamily="34" charset="0"/>
+                <a:cs typeface="Calibri" panose="020F0502020204030204" pitchFamily="34" charset="0"/>
+              </a:rPr>
+              <a:t>In this project we are using - Scalar Encoder </a:t>
+            </a:r>
+            <a:endParaRPr lang="en-IN" sz="1800" dirty="0">
+              <a:effectLst/>
+              <a:latin typeface="Calibri" panose="020F0502020204030204" pitchFamily="34" charset="0"/>
+              <a:ea typeface="Calibri" panose="020F0502020204030204" pitchFamily="34" charset="0"/>
+              <a:cs typeface="Times New Roman" panose="02020603050405020304" pitchFamily="18" charset="0"/>
+            </a:endParaRPr>
+          </a:p>
+          <a:p>
+            <a:pPr marL="0" indent="0">
+              <a:buNone/>
+            </a:pPr>
+            <a:r>
+              <a:rPr lang="en-IN" sz="1800" dirty="0">
+                <a:effectLst/>
+                <a:latin typeface="Calibri" panose="020F0502020204030204" pitchFamily="34" charset="0"/>
+                <a:ea typeface="Calibri" panose="020F0502020204030204" pitchFamily="34" charset="0"/>
+                <a:cs typeface="Calibri" panose="020F0502020204030204" pitchFamily="34" charset="0"/>
+              </a:rPr>
+              <a:t>1. The main purpose for scalar encoder is to encode numeric or floating-point value into an array of bits, where the output has 0’s with an adjacent block of 1’s. The location of the block of 1’s varies continuously depending on the input value.</a:t>
+            </a:r>
+            <a:endParaRPr lang="en-IN" sz="1800" dirty="0">
+              <a:effectLst/>
+              <a:latin typeface="Calibri" panose="020F0502020204030204" pitchFamily="34" charset="0"/>
+              <a:ea typeface="Calibri" panose="020F0502020204030204" pitchFamily="34" charset="0"/>
+              <a:cs typeface="Times New Roman" panose="02020603050405020304" pitchFamily="18" charset="0"/>
+            </a:endParaRPr>
+          </a:p>
+          <a:p>
+            <a:endParaRPr lang="en-IN" dirty="0"/>
+          </a:p>
+        </p:txBody>
+      </p:sp>
+    </p:spTree>
+    <p:extLst>
+      <p:ext uri="{BB962C8B-B14F-4D97-AF65-F5344CB8AC3E}">
+        <p14:creationId xmlns:p14="http://schemas.microsoft.com/office/powerpoint/2010/main" val="495733682"/>
+      </p:ext>
+    </p:extLst>
+  </p:cSld>
+  <p:clrMapOvr>
+    <a:masterClrMapping/>
+  </p:clrMapOvr>
+</p:sld>
+</file>
+
+<file path=ppt/slides/slide5.xml><?xml version="1.0" encoding="utf-8"?>
+<p:sld xmlns:a="http://schemas.openxmlformats.org/drawingml/2006/main" xmlns:r="http://schemas.openxmlformats.org/officeDocument/2006/relationships" xmlns:p="http://schemas.openxmlformats.org/presentationml/2006/main">
+  <p:cSld>
+    <p:spTree>
+      <p:nvGrpSpPr>
+        <p:cNvPr id="1" name=""/>
+        <p:cNvGrpSpPr/>
+        <p:nvPr/>
+      </p:nvGrpSpPr>
+      <p:grpSpPr>
+        <a:xfrm>
+          <a:off x="0" y="0"/>
+          <a:ext cx="0" cy="0"/>
+          <a:chOff x="0" y="0"/>
+          <a:chExt cx="0" cy="0"/>
+        </a:xfrm>
+      </p:grpSpPr>
+      <p:sp>
+        <p:nvSpPr>
+          <p:cNvPr id="2" name="Title 1">
+            <a:extLst>
+              <a:ext uri="{FF2B5EF4-FFF2-40B4-BE49-F238E27FC236}">
                 <a16:creationId xmlns:a16="http://schemas.microsoft.com/office/drawing/2014/main" id="{ACEDBF6E-D7C0-19E1-DF47-8FB9E8571EA7}"/>
               </a:ext>
             </a:extLst>
@@ -4093,6 +4360,136 @@
     <p:extLst>
       <p:ext uri="{BB962C8B-B14F-4D97-AF65-F5344CB8AC3E}">
         <p14:creationId xmlns:p14="http://schemas.microsoft.com/office/powerpoint/2010/main" val="1951646649"/>
+      </p:ext>
+    </p:extLst>
+  </p:cSld>
+  <p:clrMapOvr>
+    <a:masterClrMapping/>
+  </p:clrMapOvr>
+</p:sld>
+</file>
+
+<file path=ppt/slides/slide6.xml><?xml version="1.0" encoding="utf-8"?>
+<p:sld xmlns:a="http://schemas.openxmlformats.org/drawingml/2006/main" xmlns:r="http://schemas.openxmlformats.org/officeDocument/2006/relationships" xmlns:p="http://schemas.openxmlformats.org/presentationml/2006/main">
+  <p:cSld>
+    <p:spTree>
+      <p:nvGrpSpPr>
+        <p:cNvPr id="1" name=""/>
+        <p:cNvGrpSpPr/>
+        <p:nvPr/>
+      </p:nvGrpSpPr>
+      <p:grpSpPr>
+        <a:xfrm>
+          <a:off x="0" y="0"/>
+          <a:ext cx="0" cy="0"/>
+          <a:chOff x="0" y="0"/>
+          <a:chExt cx="0" cy="0"/>
+        </a:xfrm>
+      </p:grpSpPr>
+      <p:sp>
+        <p:nvSpPr>
+          <p:cNvPr id="2" name="Title 1">
+            <a:extLst>
+              <a:ext uri="{FF2B5EF4-FFF2-40B4-BE49-F238E27FC236}">
+                <a16:creationId xmlns:a16="http://schemas.microsoft.com/office/drawing/2014/main" id="{80812DF8-5B3F-78F0-5AB8-7C5D9E9497DD}"/>
+              </a:ext>
+            </a:extLst>
+          </p:cNvPr>
+          <p:cNvSpPr>
+            <a:spLocks noGrp="1"/>
+          </p:cNvSpPr>
+          <p:nvPr>
+            <p:ph type="ctrTitle"/>
+          </p:nvPr>
+        </p:nvSpPr>
+        <p:spPr>
+          <a:xfrm>
+            <a:off x="1524000" y="1122363"/>
+            <a:ext cx="9144000" cy="809074"/>
+          </a:xfrm>
+        </p:spPr>
+        <p:txBody>
+          <a:bodyPr>
+            <a:normAutofit fontScale="90000"/>
+          </a:bodyPr>
+          <a:lstStyle/>
+          <a:p>
+            <a:r>
+              <a:rPr lang="en-IN" dirty="0"/>
+              <a:t>Program Flow</a:t>
+            </a:r>
+          </a:p>
+        </p:txBody>
+      </p:sp>
+    </p:spTree>
+    <p:extLst>
+      <p:ext uri="{BB962C8B-B14F-4D97-AF65-F5344CB8AC3E}">
+        <p14:creationId xmlns:p14="http://schemas.microsoft.com/office/powerpoint/2010/main" val="2029429037"/>
+      </p:ext>
+    </p:extLst>
+  </p:cSld>
+  <p:clrMapOvr>
+    <a:masterClrMapping/>
+  </p:clrMapOvr>
+</p:sld>
+</file>
+
+<file path=ppt/slides/slide7.xml><?xml version="1.0" encoding="utf-8"?>
+<p:sld xmlns:a="http://schemas.openxmlformats.org/drawingml/2006/main" xmlns:r="http://schemas.openxmlformats.org/officeDocument/2006/relationships" xmlns:p="http://schemas.openxmlformats.org/presentationml/2006/main">
+  <p:cSld>
+    <p:spTree>
+      <p:nvGrpSpPr>
+        <p:cNvPr id="1" name=""/>
+        <p:cNvGrpSpPr/>
+        <p:nvPr/>
+      </p:nvGrpSpPr>
+      <p:grpSpPr>
+        <a:xfrm>
+          <a:off x="0" y="0"/>
+          <a:ext cx="0" cy="0"/>
+          <a:chOff x="0" y="0"/>
+          <a:chExt cx="0" cy="0"/>
+        </a:xfrm>
+      </p:grpSpPr>
+      <p:sp>
+        <p:nvSpPr>
+          <p:cNvPr id="2" name="Title 1">
+            <a:extLst>
+              <a:ext uri="{FF2B5EF4-FFF2-40B4-BE49-F238E27FC236}">
+                <a16:creationId xmlns:a16="http://schemas.microsoft.com/office/drawing/2014/main" id="{2EAB8300-8A6C-D1EE-D8C7-C1ACB6308305}"/>
+              </a:ext>
+            </a:extLst>
+          </p:cNvPr>
+          <p:cNvSpPr>
+            <a:spLocks noGrp="1"/>
+          </p:cNvSpPr>
+          <p:nvPr>
+            <p:ph type="ctrTitle"/>
+          </p:nvPr>
+        </p:nvSpPr>
+        <p:spPr>
+          <a:xfrm>
+            <a:off x="1524000" y="1122363"/>
+            <a:ext cx="9144000" cy="706437"/>
+          </a:xfrm>
+        </p:spPr>
+        <p:txBody>
+          <a:bodyPr>
+            <a:normAutofit fontScale="90000"/>
+          </a:bodyPr>
+          <a:lstStyle/>
+          <a:p>
+            <a:r>
+              <a:rPr lang="en-IN" dirty="0"/>
+              <a:t>Output Screenshot</a:t>
+            </a:r>
+          </a:p>
+        </p:txBody>
+      </p:sp>
+    </p:spTree>
+    <p:extLst>
+      <p:ext uri="{BB962C8B-B14F-4D97-AF65-F5344CB8AC3E}">
+        <p14:creationId xmlns:p14="http://schemas.microsoft.com/office/powerpoint/2010/main" val="3304583892"/>
       </p:ext>
     </p:extLst>
   </p:cSld>

</xml_diff>

<commit_message>
Added newly written methods for taking inputs in pptx file
</commit_message>
<xml_diff>
--- a/source/MultiSequenceLearning_Team_MSL/ML2223_15 Approve Prediction of Multisequence Learning.pptx
+++ b/source/MultiSequenceLearning_Team_MSL/ML2223_15 Approve Prediction of Multisequence Learning.pptx
@@ -249,7 +249,7 @@
           <a:p>
             <a:fld id="{54BB0E1A-2A42-4456-B338-6C031B28DAA4}" type="datetimeFigureOut">
               <a:rPr lang="en-IN" smtClean="0"/>
-              <a:t>09-03-2023</a:t>
+              <a:t>16-03-2023</a:t>
             </a:fld>
             <a:endParaRPr lang="en-IN"/>
           </a:p>
@@ -419,7 +419,7 @@
           <a:p>
             <a:fld id="{54BB0E1A-2A42-4456-B338-6C031B28DAA4}" type="datetimeFigureOut">
               <a:rPr lang="en-IN" smtClean="0"/>
-              <a:t>09-03-2023</a:t>
+              <a:t>16-03-2023</a:t>
             </a:fld>
             <a:endParaRPr lang="en-IN"/>
           </a:p>
@@ -599,7 +599,7 @@
           <a:p>
             <a:fld id="{54BB0E1A-2A42-4456-B338-6C031B28DAA4}" type="datetimeFigureOut">
               <a:rPr lang="en-IN" smtClean="0"/>
-              <a:t>09-03-2023</a:t>
+              <a:t>16-03-2023</a:t>
             </a:fld>
             <a:endParaRPr lang="en-IN"/>
           </a:p>
@@ -769,7 +769,7 @@
           <a:p>
             <a:fld id="{54BB0E1A-2A42-4456-B338-6C031B28DAA4}" type="datetimeFigureOut">
               <a:rPr lang="en-IN" smtClean="0"/>
-              <a:t>09-03-2023</a:t>
+              <a:t>16-03-2023</a:t>
             </a:fld>
             <a:endParaRPr lang="en-IN"/>
           </a:p>
@@ -1015,7 +1015,7 @@
           <a:p>
             <a:fld id="{54BB0E1A-2A42-4456-B338-6C031B28DAA4}" type="datetimeFigureOut">
               <a:rPr lang="en-IN" smtClean="0"/>
-              <a:t>09-03-2023</a:t>
+              <a:t>16-03-2023</a:t>
             </a:fld>
             <a:endParaRPr lang="en-IN"/>
           </a:p>
@@ -1247,7 +1247,7 @@
           <a:p>
             <a:fld id="{54BB0E1A-2A42-4456-B338-6C031B28DAA4}" type="datetimeFigureOut">
               <a:rPr lang="en-IN" smtClean="0"/>
-              <a:t>09-03-2023</a:t>
+              <a:t>16-03-2023</a:t>
             </a:fld>
             <a:endParaRPr lang="en-IN"/>
           </a:p>
@@ -1614,7 +1614,7 @@
           <a:p>
             <a:fld id="{54BB0E1A-2A42-4456-B338-6C031B28DAA4}" type="datetimeFigureOut">
               <a:rPr lang="en-IN" smtClean="0"/>
-              <a:t>09-03-2023</a:t>
+              <a:t>16-03-2023</a:t>
             </a:fld>
             <a:endParaRPr lang="en-IN"/>
           </a:p>
@@ -1732,7 +1732,7 @@
           <a:p>
             <a:fld id="{54BB0E1A-2A42-4456-B338-6C031B28DAA4}" type="datetimeFigureOut">
               <a:rPr lang="en-IN" smtClean="0"/>
-              <a:t>09-03-2023</a:t>
+              <a:t>16-03-2023</a:t>
             </a:fld>
             <a:endParaRPr lang="en-IN"/>
           </a:p>
@@ -1827,7 +1827,7 @@
           <a:p>
             <a:fld id="{54BB0E1A-2A42-4456-B338-6C031B28DAA4}" type="datetimeFigureOut">
               <a:rPr lang="en-IN" smtClean="0"/>
-              <a:t>09-03-2023</a:t>
+              <a:t>16-03-2023</a:t>
             </a:fld>
             <a:endParaRPr lang="en-IN"/>
           </a:p>
@@ -2104,7 +2104,7 @@
           <a:p>
             <a:fld id="{54BB0E1A-2A42-4456-B338-6C031B28DAA4}" type="datetimeFigureOut">
               <a:rPr lang="en-IN" smtClean="0"/>
-              <a:t>09-03-2023</a:t>
+              <a:t>16-03-2023</a:t>
             </a:fld>
             <a:endParaRPr lang="en-IN"/>
           </a:p>
@@ -2361,7 +2361,7 @@
           <a:p>
             <a:fld id="{54BB0E1A-2A42-4456-B338-6C031B28DAA4}" type="datetimeFigureOut">
               <a:rPr lang="en-IN" smtClean="0"/>
-              <a:t>09-03-2023</a:t>
+              <a:t>16-03-2023</a:t>
             </a:fld>
             <a:endParaRPr lang="en-IN"/>
           </a:p>
@@ -2574,7 +2574,7 @@
           <a:p>
             <a:fld id="{54BB0E1A-2A42-4456-B338-6C031B28DAA4}" type="datetimeFigureOut">
               <a:rPr lang="en-IN" smtClean="0"/>
-              <a:t>09-03-2023</a:t>
+              <a:t>16-03-2023</a:t>
             </a:fld>
             <a:endParaRPr lang="en-IN"/>
           </a:p>
@@ -3441,8 +3441,8 @@
         </p:nvSpPr>
         <p:spPr>
           <a:xfrm>
-            <a:off x="898850" y="877077"/>
-            <a:ext cx="10801738" cy="2948474"/>
+            <a:off x="695131" y="597158"/>
+            <a:ext cx="10801738" cy="5477070"/>
           </a:xfrm>
         </p:spPr>
         <p:txBody>
@@ -3467,173 +3467,7 @@
                 <a:ea typeface="Calibri" panose="020F0502020204030204" pitchFamily="34" charset="0"/>
                 <a:cs typeface="Times New Roman" panose="02020603050405020304" pitchFamily="18" charset="0"/>
               </a:rPr>
-              <a:t>methods - </a:t>
-            </a:r>
-            <a:br>
-              <a:rPr lang="en-IN" sz="1800" dirty="0">
-                <a:latin typeface="+mn-lt"/>
-                <a:ea typeface="Calibri" panose="020F0502020204030204" pitchFamily="34" charset="0"/>
-                <a:cs typeface="Times New Roman" panose="02020603050405020304" pitchFamily="18" charset="0"/>
-              </a:rPr>
-            </a:br>
-            <a:r>
-              <a:rPr lang="en-IN" sz="1800" dirty="0">
-                <a:latin typeface="+mn-lt"/>
-                <a:ea typeface="Calibri" panose="020F0502020204030204" pitchFamily="34" charset="0"/>
-                <a:cs typeface="Times New Roman" panose="02020603050405020304" pitchFamily="18" charset="0"/>
-              </a:rPr>
-              <a:t>1. </a:t>
-            </a:r>
-            <a:r>
-              <a:rPr lang="en-IN" sz="1800" dirty="0">
-                <a:effectLst/>
-                <a:latin typeface="+mn-lt"/>
-                <a:ea typeface="Calibri" panose="020F0502020204030204" pitchFamily="34" charset="0"/>
-                <a:cs typeface="Times New Roman" panose="02020603050405020304" pitchFamily="18" charset="0"/>
-              </a:rPr>
-              <a:t> </a:t>
-            </a:r>
-            <a:r>
-              <a:rPr lang="en-IN" sz="1800" dirty="0" err="1">
-                <a:effectLst/>
-                <a:latin typeface="+mn-lt"/>
-                <a:ea typeface="Calibri" panose="020F0502020204030204" pitchFamily="34" charset="0"/>
-                <a:cs typeface="Times New Roman" panose="02020603050405020304" pitchFamily="18" charset="0"/>
-              </a:rPr>
-              <a:t>GetInputFromTextFile</a:t>
-            </a:r>
-            <a:r>
-              <a:rPr lang="en-IN" sz="1800" dirty="0">
-                <a:effectLst/>
-                <a:latin typeface="+mn-lt"/>
-                <a:ea typeface="Calibri" panose="020F0502020204030204" pitchFamily="34" charset="0"/>
-                <a:cs typeface="Times New Roman" panose="02020603050405020304" pitchFamily="18" charset="0"/>
-              </a:rPr>
-              <a:t> –</a:t>
-            </a:r>
-            <a:br>
-              <a:rPr lang="en-IN" sz="1800" dirty="0">
-                <a:effectLst/>
-                <a:latin typeface="+mn-lt"/>
-                <a:ea typeface="Calibri" panose="020F0502020204030204" pitchFamily="34" charset="0"/>
-                <a:cs typeface="Times New Roman" panose="02020603050405020304" pitchFamily="18" charset="0"/>
-              </a:rPr>
-            </a:br>
-            <a:r>
-              <a:rPr lang="en-IN" sz="1800" dirty="0">
-                <a:effectLst/>
-                <a:latin typeface="+mn-lt"/>
-                <a:ea typeface="Calibri" panose="020F0502020204030204" pitchFamily="34" charset="0"/>
-                <a:cs typeface="Times New Roman" panose="02020603050405020304" pitchFamily="18" charset="0"/>
-              </a:rPr>
-              <a:t>     </a:t>
-            </a:r>
-            <a:r>
-              <a:rPr lang="en-IN" sz="1800" dirty="0" err="1">
-                <a:effectLst/>
-                <a:latin typeface="+mn-lt"/>
-                <a:ea typeface="Calibri" panose="020F0502020204030204" pitchFamily="34" charset="0"/>
-                <a:cs typeface="Times New Roman" panose="02020603050405020304" pitchFamily="18" charset="0"/>
-              </a:rPr>
-              <a:t>i</a:t>
-            </a:r>
-            <a:r>
-              <a:rPr lang="en-IN" sz="1800" dirty="0">
-                <a:effectLst/>
-                <a:latin typeface="+mn-lt"/>
-                <a:ea typeface="Calibri" panose="020F0502020204030204" pitchFamily="34" charset="0"/>
-                <a:cs typeface="Times New Roman" panose="02020603050405020304" pitchFamily="18" charset="0"/>
-              </a:rPr>
-              <a:t>. Created new method in </a:t>
-            </a:r>
-            <a:r>
-              <a:rPr lang="en-IN" sz="1800" dirty="0" err="1">
-                <a:effectLst/>
-                <a:latin typeface="+mn-lt"/>
-                <a:ea typeface="Calibri" panose="020F0502020204030204" pitchFamily="34" charset="0"/>
-                <a:cs typeface="Times New Roman" panose="02020603050405020304" pitchFamily="18" charset="0"/>
-              </a:rPr>
-              <a:t>Program.cs</a:t>
-            </a:r>
-            <a:r>
-              <a:rPr lang="en-IN" sz="1800" dirty="0">
-                <a:effectLst/>
-                <a:latin typeface="+mn-lt"/>
-                <a:ea typeface="Calibri" panose="020F0502020204030204" pitchFamily="34" charset="0"/>
-                <a:cs typeface="Times New Roman" panose="02020603050405020304" pitchFamily="18" charset="0"/>
-              </a:rPr>
-              <a:t> for eliminating the hard coded inputs and getting from local text file.</a:t>
-            </a:r>
-            <a:br>
-              <a:rPr lang="en-IN" sz="1800" dirty="0">
-                <a:effectLst/>
-                <a:latin typeface="+mn-lt"/>
-                <a:ea typeface="Calibri" panose="020F0502020204030204" pitchFamily="34" charset="0"/>
-                <a:cs typeface="Times New Roman" panose="02020603050405020304" pitchFamily="18" charset="0"/>
-              </a:rPr>
-            </a:br>
-            <a:r>
-              <a:rPr lang="en-IN" sz="1800" dirty="0">
-                <a:effectLst/>
-                <a:latin typeface="+mn-lt"/>
-                <a:ea typeface="Calibri" panose="020F0502020204030204" pitchFamily="34" charset="0"/>
-                <a:cs typeface="Times New Roman" panose="02020603050405020304" pitchFamily="18" charset="0"/>
-              </a:rPr>
-              <a:t>    </a:t>
-            </a:r>
-            <a:r>
-              <a:rPr lang="en-IN" sz="1800" dirty="0" err="1">
-                <a:effectLst/>
-                <a:latin typeface="+mn-lt"/>
-                <a:ea typeface="Calibri" panose="020F0502020204030204" pitchFamily="34" charset="0"/>
-                <a:cs typeface="Times New Roman" panose="02020603050405020304" pitchFamily="18" charset="0"/>
-              </a:rPr>
-              <a:t>Ii</a:t>
-            </a:r>
-            <a:r>
-              <a:rPr lang="en-IN" sz="1800" dirty="0">
-                <a:effectLst/>
-                <a:latin typeface="+mn-lt"/>
-                <a:ea typeface="Calibri" panose="020F0502020204030204" pitchFamily="34" charset="0"/>
-                <a:cs typeface="Times New Roman" panose="02020603050405020304" pitchFamily="18" charset="0"/>
-              </a:rPr>
-              <a:t>. </a:t>
-            </a:r>
-            <a:r>
-              <a:rPr lang="en-IN" sz="1800" dirty="0" err="1">
-                <a:effectLst/>
-                <a:latin typeface="+mn-lt"/>
-                <a:ea typeface="Calibri" panose="020F0502020204030204" pitchFamily="34" charset="0"/>
-                <a:cs typeface="Times New Roman" panose="02020603050405020304" pitchFamily="18" charset="0"/>
-              </a:rPr>
-              <a:t>Splitted</a:t>
-            </a:r>
-            <a:r>
-              <a:rPr lang="en-IN" sz="1800" dirty="0">
-                <a:effectLst/>
-                <a:latin typeface="+mn-lt"/>
-                <a:ea typeface="Calibri" panose="020F0502020204030204" pitchFamily="34" charset="0"/>
-                <a:cs typeface="Times New Roman" panose="02020603050405020304" pitchFamily="18" charset="0"/>
-              </a:rPr>
-              <a:t> out the input sequences using </a:t>
-            </a:r>
-            <a:r>
-              <a:rPr lang="en-IN" sz="1800" dirty="0" err="1">
-                <a:effectLst/>
-                <a:latin typeface="+mn-lt"/>
-                <a:ea typeface="Calibri" panose="020F0502020204030204" pitchFamily="34" charset="0"/>
-                <a:cs typeface="Times New Roman" panose="02020603050405020304" pitchFamily="18" charset="0"/>
-              </a:rPr>
-              <a:t>regulare</a:t>
-            </a:r>
-            <a:r>
-              <a:rPr lang="en-IN" sz="1800" dirty="0">
-                <a:effectLst/>
-                <a:latin typeface="+mn-lt"/>
-                <a:ea typeface="Calibri" panose="020F0502020204030204" pitchFamily="34" charset="0"/>
-                <a:cs typeface="Times New Roman" panose="02020603050405020304" pitchFamily="18" charset="0"/>
-              </a:rPr>
-              <a:t> expression.</a:t>
+              <a:t>methods  – </a:t>
             </a:r>
             <a:br>
               <a:rPr lang="en-IN" sz="1800" dirty="0">
@@ -3651,6 +3485,15 @@
                 <a:cs typeface="Times New Roman" panose="02020603050405020304" pitchFamily="18" charset="0"/>
               </a:rPr>
             </a:br>
+            <a:r>
+              <a:rPr lang="en-IN" sz="1800" dirty="0">
+                <a:effectLst/>
+                <a:latin typeface="+mn-lt"/>
+                <a:ea typeface="Calibri" panose="020F0502020204030204" pitchFamily="34" charset="0"/>
+                <a:cs typeface="Times New Roman" panose="02020603050405020304" pitchFamily="18" charset="0"/>
+              </a:rPr>
+              <a:t>1. </a:t>
+            </a:r>
             <a:br>
               <a:rPr lang="en-IN" sz="1800" dirty="0">
                 <a:effectLst/>
@@ -3659,103 +3502,343 @@
                 <a:cs typeface="Times New Roman" panose="02020603050405020304" pitchFamily="18" charset="0"/>
               </a:rPr>
             </a:br>
-            <a:r>
-              <a:rPr lang="en-IN" sz="1800" dirty="0">
-                <a:effectLst/>
-                <a:latin typeface="+mn-lt"/>
-                <a:ea typeface="Calibri" panose="020F0502020204030204" pitchFamily="34" charset="0"/>
-                <a:cs typeface="Times New Roman" panose="02020603050405020304" pitchFamily="18" charset="0"/>
+            <a:br>
+              <a:rPr lang="en-IN" sz="1800" dirty="0">
+                <a:latin typeface="+mn-lt"/>
+                <a:ea typeface="Calibri" panose="020F0502020204030204" pitchFamily="34" charset="0"/>
+                <a:cs typeface="Times New Roman" panose="02020603050405020304" pitchFamily="18" charset="0"/>
+              </a:rPr>
+            </a:br>
+            <a:r>
+              <a:rPr lang="en-IN" sz="1800" dirty="0" err="1">
+                <a:latin typeface="+mn-lt"/>
+                <a:ea typeface="Calibri" panose="020F0502020204030204" pitchFamily="34" charset="0"/>
+                <a:cs typeface="Times New Roman" panose="02020603050405020304" pitchFamily="18" charset="0"/>
+              </a:rPr>
+              <a:t>i</a:t>
+            </a:r>
+            <a:r>
+              <a:rPr lang="en-IN" sz="1800" dirty="0">
+                <a:latin typeface="+mn-lt"/>
+                <a:ea typeface="Calibri" panose="020F0502020204030204" pitchFamily="34" charset="0"/>
+                <a:cs typeface="Times New Roman" panose="02020603050405020304" pitchFamily="18" charset="0"/>
+              </a:rPr>
+              <a:t>. </a:t>
+            </a:r>
+            <a:r>
+              <a:rPr lang="en-IN" sz="1800" dirty="0">
+                <a:effectLst/>
+                <a:latin typeface="+mn-lt"/>
+                <a:ea typeface="Calibri" panose="020F0502020204030204" pitchFamily="34" charset="0"/>
+                <a:cs typeface="Times New Roman" panose="02020603050405020304" pitchFamily="18" charset="0"/>
+              </a:rPr>
+              <a:t> </a:t>
+            </a:r>
+            <a:r>
+              <a:rPr lang="en-IN" sz="1800" dirty="0" err="1">
+                <a:effectLst/>
+                <a:latin typeface="+mn-lt"/>
+                <a:ea typeface="Calibri" panose="020F0502020204030204" pitchFamily="34" charset="0"/>
+                <a:cs typeface="Times New Roman" panose="02020603050405020304" pitchFamily="18" charset="0"/>
+              </a:rPr>
+              <a:t>GetInputFromTextFile</a:t>
+            </a:r>
+            <a:r>
+              <a:rPr lang="en-IN" sz="1800" dirty="0">
+                <a:effectLst/>
+                <a:latin typeface="+mn-lt"/>
+                <a:ea typeface="Calibri" panose="020F0502020204030204" pitchFamily="34" charset="0"/>
+                <a:cs typeface="Times New Roman" panose="02020603050405020304" pitchFamily="18" charset="0"/>
+              </a:rPr>
+              <a:t> () – </a:t>
+            </a:r>
+            <a:r>
+              <a:rPr lang="en-US" sz="1800" dirty="0">
+                <a:latin typeface="+mn-lt"/>
+              </a:rPr>
+              <a:t>method to add input sequences through external text files</a:t>
+            </a:r>
+            <a:br>
+              <a:rPr lang="en-IN" sz="1800" dirty="0">
+                <a:effectLst/>
+                <a:latin typeface="+mn-lt"/>
+                <a:ea typeface="Calibri" panose="020F0502020204030204" pitchFamily="34" charset="0"/>
+                <a:cs typeface="Times New Roman" panose="02020603050405020304" pitchFamily="18" charset="0"/>
+              </a:rPr>
+            </a:br>
+            <a:r>
+              <a:rPr lang="en-IN" sz="1800" dirty="0">
+                <a:effectLst/>
+                <a:latin typeface="+mn-lt"/>
+                <a:ea typeface="Calibri" panose="020F0502020204030204" pitchFamily="34" charset="0"/>
+                <a:cs typeface="Times New Roman" panose="02020603050405020304" pitchFamily="18" charset="0"/>
+              </a:rPr>
+              <a:t>     </a:t>
+            </a:r>
+            <a:r>
+              <a:rPr lang="en-IN" sz="1800" dirty="0" err="1">
+                <a:effectLst/>
+                <a:latin typeface="+mn-lt"/>
+                <a:ea typeface="Calibri" panose="020F0502020204030204" pitchFamily="34" charset="0"/>
+                <a:cs typeface="Times New Roman" panose="02020603050405020304" pitchFamily="18" charset="0"/>
+              </a:rPr>
+              <a:t>i</a:t>
+            </a:r>
+            <a:r>
+              <a:rPr lang="en-IN" sz="1800" dirty="0">
+                <a:effectLst/>
+                <a:latin typeface="+mn-lt"/>
+                <a:ea typeface="Calibri" panose="020F0502020204030204" pitchFamily="34" charset="0"/>
+                <a:cs typeface="Times New Roman" panose="02020603050405020304" pitchFamily="18" charset="0"/>
+              </a:rPr>
+              <a:t>. Created new method in </a:t>
+            </a:r>
+            <a:r>
+              <a:rPr lang="en-IN" sz="1800" dirty="0" err="1">
+                <a:effectLst/>
+                <a:latin typeface="+mn-lt"/>
+                <a:ea typeface="Calibri" panose="020F0502020204030204" pitchFamily="34" charset="0"/>
+                <a:cs typeface="Times New Roman" panose="02020603050405020304" pitchFamily="18" charset="0"/>
+              </a:rPr>
+              <a:t>Program.cs</a:t>
+            </a:r>
+            <a:r>
+              <a:rPr lang="en-IN" sz="1800" dirty="0">
+                <a:effectLst/>
+                <a:latin typeface="+mn-lt"/>
+                <a:ea typeface="Calibri" panose="020F0502020204030204" pitchFamily="34" charset="0"/>
+                <a:cs typeface="Times New Roman" panose="02020603050405020304" pitchFamily="18" charset="0"/>
+              </a:rPr>
+              <a:t> for eliminating the hard coded inputs and getting from local text file.</a:t>
+            </a:r>
+            <a:br>
+              <a:rPr lang="en-IN" sz="1800" dirty="0">
+                <a:effectLst/>
+                <a:latin typeface="+mn-lt"/>
+                <a:ea typeface="Calibri" panose="020F0502020204030204" pitchFamily="34" charset="0"/>
+                <a:cs typeface="Times New Roman" panose="02020603050405020304" pitchFamily="18" charset="0"/>
+              </a:rPr>
+            </a:br>
+            <a:r>
+              <a:rPr lang="en-IN" sz="1800" dirty="0">
+                <a:effectLst/>
+                <a:latin typeface="+mn-lt"/>
+                <a:ea typeface="Calibri" panose="020F0502020204030204" pitchFamily="34" charset="0"/>
+                <a:cs typeface="Times New Roman" panose="02020603050405020304" pitchFamily="18" charset="0"/>
+              </a:rPr>
+              <a:t>    </a:t>
+            </a:r>
+            <a:r>
+              <a:rPr lang="en-IN" sz="1800" dirty="0" err="1">
+                <a:effectLst/>
+                <a:latin typeface="+mn-lt"/>
+                <a:ea typeface="Calibri" panose="020F0502020204030204" pitchFamily="34" charset="0"/>
+                <a:cs typeface="Times New Roman" panose="02020603050405020304" pitchFamily="18" charset="0"/>
+              </a:rPr>
+              <a:t>Ii</a:t>
+            </a:r>
+            <a:r>
+              <a:rPr lang="en-IN" sz="1800" dirty="0">
+                <a:effectLst/>
+                <a:latin typeface="+mn-lt"/>
+                <a:ea typeface="Calibri" panose="020F0502020204030204" pitchFamily="34" charset="0"/>
+                <a:cs typeface="Times New Roman" panose="02020603050405020304" pitchFamily="18" charset="0"/>
+              </a:rPr>
+              <a:t>. </a:t>
+            </a:r>
+            <a:r>
+              <a:rPr lang="en-IN" sz="1800" dirty="0" err="1">
+                <a:effectLst/>
+                <a:latin typeface="+mn-lt"/>
+                <a:ea typeface="Calibri" panose="020F0502020204030204" pitchFamily="34" charset="0"/>
+                <a:cs typeface="Times New Roman" panose="02020603050405020304" pitchFamily="18" charset="0"/>
+              </a:rPr>
+              <a:t>Splitted</a:t>
+            </a:r>
+            <a:r>
+              <a:rPr lang="en-IN" sz="1800" dirty="0">
+                <a:effectLst/>
+                <a:latin typeface="+mn-lt"/>
+                <a:ea typeface="Calibri" panose="020F0502020204030204" pitchFamily="34" charset="0"/>
+                <a:cs typeface="Times New Roman" panose="02020603050405020304" pitchFamily="18" charset="0"/>
+              </a:rPr>
+              <a:t> out the input sequences using </a:t>
+            </a:r>
+            <a:r>
+              <a:rPr lang="en-IN" sz="1800" dirty="0" err="1">
+                <a:effectLst/>
+                <a:latin typeface="+mn-lt"/>
+                <a:ea typeface="Calibri" panose="020F0502020204030204" pitchFamily="34" charset="0"/>
+                <a:cs typeface="Times New Roman" panose="02020603050405020304" pitchFamily="18" charset="0"/>
+              </a:rPr>
+              <a:t>regulare</a:t>
+            </a:r>
+            <a:r>
+              <a:rPr lang="en-IN" sz="1800" dirty="0">
+                <a:effectLst/>
+                <a:latin typeface="+mn-lt"/>
+                <a:ea typeface="Calibri" panose="020F0502020204030204" pitchFamily="34" charset="0"/>
+                <a:cs typeface="Times New Roman" panose="02020603050405020304" pitchFamily="18" charset="0"/>
+              </a:rPr>
+              <a:t> expression.</a:t>
+            </a:r>
+            <a:br>
+              <a:rPr lang="en-IN" sz="1800" dirty="0">
+                <a:effectLst/>
+                <a:latin typeface="+mn-lt"/>
+                <a:ea typeface="Calibri" panose="020F0502020204030204" pitchFamily="34" charset="0"/>
+                <a:cs typeface="Times New Roman" panose="02020603050405020304" pitchFamily="18" charset="0"/>
+              </a:rPr>
+            </a:br>
+            <a:br>
+              <a:rPr lang="en-IN" sz="1800" dirty="0">
+                <a:effectLst/>
+                <a:latin typeface="+mn-lt"/>
+                <a:ea typeface="Calibri" panose="020F0502020204030204" pitchFamily="34" charset="0"/>
+                <a:cs typeface="Times New Roman" panose="02020603050405020304" pitchFamily="18" charset="0"/>
+              </a:rPr>
+            </a:br>
+            <a:br>
+              <a:rPr lang="en-IN" sz="1800" dirty="0">
+                <a:effectLst/>
+                <a:latin typeface="+mn-lt"/>
+                <a:ea typeface="Calibri" panose="020F0502020204030204" pitchFamily="34" charset="0"/>
+                <a:cs typeface="Times New Roman" panose="02020603050405020304" pitchFamily="18" charset="0"/>
+              </a:rPr>
+            </a:br>
+            <a:r>
+              <a:rPr lang="en-IN" sz="1800" dirty="0">
+                <a:effectLst/>
+                <a:latin typeface="+mn-lt"/>
+                <a:ea typeface="Calibri" panose="020F0502020204030204" pitchFamily="34" charset="0"/>
+                <a:cs typeface="Times New Roman" panose="02020603050405020304" pitchFamily="18" charset="0"/>
+              </a:rPr>
+              <a:t>ii. </a:t>
+            </a:r>
+            <a:r>
+              <a:rPr lang="en-IN" sz="1800" dirty="0" err="1">
+                <a:effectLst/>
+                <a:latin typeface="+mn-lt"/>
+                <a:ea typeface="Calibri" panose="020F0502020204030204" pitchFamily="34" charset="0"/>
+                <a:cs typeface="Times New Roman" panose="02020603050405020304" pitchFamily="18" charset="0"/>
+              </a:rPr>
+              <a:t>GetSubSequenceInputFromTextFile</a:t>
+            </a:r>
+            <a:r>
+              <a:rPr lang="en-IN" sz="1800" dirty="0">
+                <a:effectLst/>
+                <a:latin typeface="+mn-lt"/>
+                <a:ea typeface="Calibri" panose="020F0502020204030204" pitchFamily="34" charset="0"/>
+                <a:cs typeface="Times New Roman" panose="02020603050405020304" pitchFamily="18" charset="0"/>
+              </a:rPr>
+              <a:t> () - </a:t>
+            </a:r>
+            <a:r>
+              <a:rPr lang="en-US" sz="1800" dirty="0">
+                <a:latin typeface="+mn-lt"/>
+              </a:rPr>
+              <a:t>Method to read subsequences input from text files</a:t>
+            </a:r>
+            <a:r>
+              <a:rPr lang="en-IN" sz="1800" dirty="0">
+                <a:effectLst/>
+                <a:latin typeface="+mn-lt"/>
+                <a:ea typeface="Calibri" panose="020F0502020204030204" pitchFamily="34" charset="0"/>
+                <a:cs typeface="Times New Roman" panose="02020603050405020304" pitchFamily="18" charset="0"/>
+              </a:rPr>
+              <a:t>.</a:t>
+            </a:r>
+            <a:br>
+              <a:rPr lang="en-IN" sz="1800" dirty="0">
+                <a:effectLst/>
+                <a:latin typeface="+mn-lt"/>
+                <a:ea typeface="Calibri" panose="020F0502020204030204" pitchFamily="34" charset="0"/>
+                <a:cs typeface="Times New Roman" panose="02020603050405020304" pitchFamily="18" charset="0"/>
+              </a:rPr>
+            </a:br>
+            <a:br>
+              <a:rPr lang="en-IN" sz="1800" dirty="0">
+                <a:latin typeface="+mn-lt"/>
+              </a:rPr>
+            </a:br>
+            <a:br>
+              <a:rPr lang="en-IN" sz="1800" dirty="0">
+                <a:latin typeface="+mn-lt"/>
+              </a:rPr>
+            </a:br>
+            <a:br>
+              <a:rPr lang="en-IN" sz="1800" dirty="0">
+                <a:latin typeface="+mn-lt"/>
+              </a:rPr>
+            </a:br>
+            <a:r>
+              <a:rPr lang="en-IN" sz="1800" dirty="0">
+                <a:latin typeface="+mn-lt"/>
               </a:rPr>
               <a:t>2. </a:t>
             </a:r>
+            <a:br>
+              <a:rPr lang="en-IN" sz="1800" dirty="0">
+                <a:latin typeface="+mn-lt"/>
+              </a:rPr>
+            </a:br>
             <a:r>
               <a:rPr lang="en-IN" sz="1800" dirty="0" err="1">
-                <a:effectLst/>
-                <a:latin typeface="+mn-lt"/>
-                <a:ea typeface="Calibri" panose="020F0502020204030204" pitchFamily="34" charset="0"/>
-                <a:cs typeface="Times New Roman" panose="02020603050405020304" pitchFamily="18" charset="0"/>
-              </a:rPr>
-              <a:t>GetSubSequenceInputFromTextFile</a:t>
-            </a:r>
-            <a:r>
-              <a:rPr lang="en-IN" sz="1800" dirty="0">
-                <a:effectLst/>
-                <a:latin typeface="+mn-lt"/>
-                <a:ea typeface="Calibri" panose="020F0502020204030204" pitchFamily="34" charset="0"/>
-                <a:cs typeface="Times New Roman" panose="02020603050405020304" pitchFamily="18" charset="0"/>
-              </a:rPr>
-              <a:t> - Written the logic for subsequence inputs.</a:t>
+                <a:latin typeface="+mn-lt"/>
+              </a:rPr>
+              <a:t>i</a:t>
+            </a:r>
+            <a:r>
+              <a:rPr lang="en-IN" sz="1800" dirty="0">
+                <a:latin typeface="+mn-lt"/>
+              </a:rPr>
+              <a:t>.  </a:t>
+            </a:r>
+            <a:r>
+              <a:rPr lang="en-IN" sz="1800" dirty="0" err="1">
+                <a:latin typeface="+mn-lt"/>
+              </a:rPr>
+              <a:t>GetInputFromExcelFile</a:t>
+            </a:r>
+            <a:r>
+              <a:rPr lang="en-IN" sz="1800" dirty="0">
+                <a:latin typeface="+mn-lt"/>
+              </a:rPr>
+              <a:t>() - </a:t>
+            </a:r>
+            <a:r>
+              <a:rPr lang="en-US" sz="1800" dirty="0">
+                <a:latin typeface="+mn-lt"/>
+              </a:rPr>
+              <a:t>Method to read the data from CSV file </a:t>
             </a:r>
             <a:br>
               <a:rPr lang="en-IN" sz="1800" dirty="0">
-                <a:effectLst/>
-                <a:latin typeface="+mn-lt"/>
-                <a:ea typeface="Calibri" panose="020F0502020204030204" pitchFamily="34" charset="0"/>
-                <a:cs typeface="Times New Roman" panose="02020603050405020304" pitchFamily="18" charset="0"/>
+                <a:latin typeface="+mn-lt"/>
               </a:rPr>
             </a:br>
             <a:r>
-              <a:rPr lang="en-IN" sz="1800" dirty="0">
-                <a:effectLst/>
-                <a:latin typeface="+mn-lt"/>
-                <a:ea typeface="Calibri" panose="020F0502020204030204" pitchFamily="34" charset="0"/>
-                <a:cs typeface="Times New Roman" panose="02020603050405020304" pitchFamily="18" charset="0"/>
-              </a:rPr>
-              <a:t>3. </a:t>
-            </a:r>
-            <a:r>
               <a:rPr lang="en-IN" sz="1800" dirty="0" err="1">
-                <a:solidFill>
-                  <a:srgbClr val="000000"/>
-                </a:solidFill>
-                <a:latin typeface="+mn-lt"/>
-              </a:rPr>
-              <a:t>PredictNextElement</a:t>
-            </a:r>
-            <a:r>
-              <a:rPr lang="en-IN" sz="1800" dirty="0">
-                <a:solidFill>
-                  <a:srgbClr val="000000"/>
-                </a:solidFill>
-                <a:latin typeface="+mn-lt"/>
-              </a:rPr>
-              <a:t>(predictor, list) -</a:t>
+                <a:latin typeface="+mn-lt"/>
+              </a:rPr>
+              <a:t>ii.GetSubSequencesInputFromExcelFile</a:t>
+            </a:r>
+            <a:r>
+              <a:rPr lang="en-IN" sz="1800" dirty="0">
+                <a:latin typeface="+mn-lt"/>
+              </a:rPr>
+              <a:t>();</a:t>
             </a:r>
             <a:br>
               <a:rPr lang="en-IN" sz="1800" dirty="0">
-                <a:solidFill>
-                  <a:srgbClr val="000000"/>
-                </a:solidFill>
                 <a:latin typeface="+mn-lt"/>
               </a:rPr>
             </a:br>
-            <a:r>
-              <a:rPr lang="en-IN" sz="1800" dirty="0">
-                <a:solidFill>
-                  <a:srgbClr val="000000"/>
-                </a:solidFill>
-                <a:latin typeface="+mn-lt"/>
-              </a:rPr>
-              <a:t>4. </a:t>
-            </a:r>
-            <a:r>
-              <a:rPr lang="en-IN" sz="1800" dirty="0" err="1">
-                <a:solidFill>
-                  <a:srgbClr val="000000"/>
-                </a:solidFill>
-                <a:latin typeface="+mn-lt"/>
-              </a:rPr>
-              <a:t>RunPredictionMultiSequenceExperiment</a:t>
-            </a:r>
-            <a:r>
-              <a:rPr lang="en-IN" sz="1800" dirty="0">
-                <a:solidFill>
-                  <a:srgbClr val="000000"/>
-                </a:solidFill>
-                <a:latin typeface="+mn-lt"/>
-              </a:rPr>
-              <a:t>() -</a:t>
-            </a:r>
+            <a:br>
+              <a:rPr lang="en-IN" sz="1800" dirty="0">
+                <a:latin typeface="+mn-lt"/>
+              </a:rPr>
+            </a:br>
             <a:br>
               <a:rPr lang="en-IN" sz="1800" dirty="0">
                 <a:effectLst/>

</xml_diff>